<commit_message>
fixed notation issues in multilingual nlp lecture
</commit_message>
<xml_diff>
--- a/lectures/09_multilingual_nlp/09_multilingual_nlp.pptx
+++ b/lectures/09_multilingual_nlp/09_multilingual_nlp.pptx
@@ -147,7 +147,7 @@
 <file path=ppt/revisionInfo.xml><?xml version="1.0" encoding="utf-8"?>
 <p1510:revInfo xmlns:a="http://schemas.openxmlformats.org/drawingml/2006/main" xmlns:r="http://schemas.openxmlformats.org/officeDocument/2006/relationships" xmlns:p1510="http://schemas.microsoft.com/office/powerpoint/2015/10/main">
   <p1510:revLst>
-    <p1510:client id="{3E0441CD-7904-42F4-39B8-FBA803B5B1A1}" v="19" dt="2025-05-23T15:42:32.634"/>
+    <p1510:client id="{2AE81481-21E7-B4C0-AE59-5DE0F0957FD1}" v="7" dt="2025-05-28T10:03:09.031"/>
   </p1510:revLst>
 </p1510:revInfo>
 </file>
@@ -14557,6 +14557,15 @@
               <a:t>D</a:t>
             </a:r>
             <a:r>
+              <a:rPr lang="en-US" sz="2000" b="1" i="1" spc="-1" baseline="-25000" dirty="0">
+                <a:solidFill>
+                  <a:srgbClr val="003056"/>
+                </a:solidFill>
+                <a:latin typeface="Calibri"/>
+              </a:rPr>
+              <a:t>s</a:t>
+            </a:r>
+            <a:r>
               <a:rPr lang="en-US" sz="2000" b="1" spc="-1" dirty="0">
                 <a:solidFill>
                   <a:srgbClr val="003056"/>
@@ -16115,10 +16124,10 @@
                 <a:ea typeface="+mn-lt"/>
                 <a:cs typeface="+mn-lt"/>
               </a:rPr>
-              <a:t>D, </a:t>
-            </a:r>
-            <a:r>
-              <a:rPr lang="en-US" sz="2000" spc="-1" dirty="0">
+              <a:t>D</a:t>
+            </a:r>
+            <a:r>
+              <a:rPr lang="en-US" sz="2000" i="1" spc="-1" baseline="-25000" dirty="0">
                 <a:solidFill>
                   <a:srgbClr val="003056"/>
                 </a:solidFill>
@@ -16126,10 +16135,10 @@
                 <a:ea typeface="+mn-lt"/>
                 <a:cs typeface="+mn-lt"/>
               </a:rPr>
-              <a:t>take </a:t>
-            </a:r>
-            <a:r>
-              <a:rPr lang="en-US" sz="2000" b="1" i="1" spc="-1" dirty="0">
+              <a:t>s</a:t>
+            </a:r>
+            <a:r>
+              <a:rPr lang="en-US" sz="2000" i="1" spc="-1" dirty="0">
                 <a:solidFill>
                   <a:srgbClr val="003056"/>
                 </a:solidFill>
@@ -16137,10 +16146,10 @@
                 <a:ea typeface="+mn-lt"/>
                 <a:cs typeface="+mn-lt"/>
               </a:rPr>
-              <a:t>w</a:t>
-            </a:r>
-            <a:r>
-              <a:rPr lang="en-US" sz="2000" i="1" spc="-1" baseline="-25000" dirty="0">
+              <a:t>, </a:t>
+            </a:r>
+            <a:r>
+              <a:rPr lang="en-US" sz="2000" spc="-1" dirty="0">
                 <a:solidFill>
                   <a:srgbClr val="003056"/>
                 </a:solidFill>
@@ -16148,10 +16157,10 @@
                 <a:ea typeface="+mn-lt"/>
                 <a:cs typeface="+mn-lt"/>
               </a:rPr>
-              <a:t>i</a:t>
-            </a:r>
-            <a:r>
-              <a:rPr lang="en-US" sz="2000" i="1" spc="-1" baseline="30000" dirty="0">
+              <a:t>take </a:t>
+            </a:r>
+            <a:r>
+              <a:rPr lang="en-US" sz="2000" b="1" i="1" spc="-1" dirty="0">
                 <a:solidFill>
                   <a:srgbClr val="003056"/>
                 </a:solidFill>
@@ -16159,10 +16168,10 @@
                 <a:ea typeface="+mn-lt"/>
                 <a:cs typeface="+mn-lt"/>
               </a:rPr>
-              <a:t>s</a:t>
-            </a:r>
-            <a:r>
-              <a:rPr lang="en-US" sz="2000" spc="-1" dirty="0">
+              <a:t>w</a:t>
+            </a:r>
+            <a:r>
+              <a:rPr lang="en-US" sz="2000" i="1" spc="-1" baseline="-25000" dirty="0">
                 <a:solidFill>
                   <a:srgbClr val="003056"/>
                 </a:solidFill>
@@ -16170,10 +16179,10 @@
                 <a:ea typeface="+mn-lt"/>
                 <a:cs typeface="+mn-lt"/>
               </a:rPr>
-              <a:t> as query and rank all rows from </a:t>
-            </a:r>
-            <a:r>
-              <a:rPr lang="en-US" sz="2000" b="1" i="1" spc="-1" err="1">
+              <a:t>i</a:t>
+            </a:r>
+            <a:r>
+              <a:rPr lang="en-US" sz="2000" i="1" spc="-1" baseline="30000" dirty="0">
                 <a:solidFill>
                   <a:srgbClr val="003056"/>
                 </a:solidFill>
@@ -16181,10 +16190,10 @@
                 <a:ea typeface="+mn-lt"/>
                 <a:cs typeface="+mn-lt"/>
               </a:rPr>
-              <a:t>W</a:t>
-            </a:r>
-            <a:r>
-              <a:rPr lang="en-US" sz="2000" i="1" spc="-1" baseline="30000" err="1">
+              <a:t>s</a:t>
+            </a:r>
+            <a:r>
+              <a:rPr lang="en-US" sz="2000" spc="-1" dirty="0">
                 <a:solidFill>
                   <a:srgbClr val="003056"/>
                 </a:solidFill>
@@ -16192,10 +16201,10 @@
                 <a:ea typeface="+mn-lt"/>
                 <a:cs typeface="+mn-lt"/>
               </a:rPr>
-              <a:t>t</a:t>
-            </a:r>
-            <a:r>
-              <a:rPr lang="en-US" sz="2000" spc="-1" dirty="0">
+              <a:t> as query and rank all rows from </a:t>
+            </a:r>
+            <a:r>
+              <a:rPr lang="en-US" sz="2000" b="1" i="1" spc="-1" dirty="0" err="1">
                 <a:solidFill>
                   <a:srgbClr val="003056"/>
                 </a:solidFill>
@@ -16203,10 +16212,10 @@
                 <a:ea typeface="+mn-lt"/>
                 <a:cs typeface="+mn-lt"/>
               </a:rPr>
-              <a:t> based on similarity to </a:t>
-            </a:r>
-            <a:r>
-              <a:rPr lang="en-US" sz="2000" b="1" i="1" spc="-1" dirty="0">
+              <a:t>W</a:t>
+            </a:r>
+            <a:r>
+              <a:rPr lang="en-US" sz="2000" i="1" spc="-1" baseline="30000" dirty="0" err="1">
                 <a:solidFill>
                   <a:srgbClr val="003056"/>
                 </a:solidFill>
@@ -16214,10 +16223,10 @@
                 <a:ea typeface="+mn-lt"/>
                 <a:cs typeface="+mn-lt"/>
               </a:rPr>
-              <a:t>w</a:t>
-            </a:r>
-            <a:r>
-              <a:rPr lang="en-US" sz="2000" i="1" spc="-1" baseline="-25000" dirty="0">
+              <a:t>t</a:t>
+            </a:r>
+            <a:r>
+              <a:rPr lang="en-US" sz="2000" spc="-1" dirty="0">
                 <a:solidFill>
                   <a:srgbClr val="003056"/>
                 </a:solidFill>
@@ -16225,10 +16234,10 @@
                 <a:ea typeface="+mn-lt"/>
                 <a:cs typeface="+mn-lt"/>
               </a:rPr>
-              <a:t>i</a:t>
-            </a:r>
-            <a:r>
-              <a:rPr lang="en-US" sz="2000" i="1" spc="-1" baseline="30000" dirty="0">
+              <a:t> based on similarity to </a:t>
+            </a:r>
+            <a:r>
+              <a:rPr lang="en-US" sz="2000" b="1" i="1" spc="-1" dirty="0">
                 <a:solidFill>
                   <a:srgbClr val="003056"/>
                 </a:solidFill>
@@ -16236,10 +16245,10 @@
                 <a:ea typeface="+mn-lt"/>
                 <a:cs typeface="+mn-lt"/>
               </a:rPr>
-              <a:t>s</a:t>
-            </a:r>
-            <a:r>
-              <a:rPr lang="en-US" sz="2000" spc="-1" dirty="0">
+              <a:t>w</a:t>
+            </a:r>
+            <a:r>
+              <a:rPr lang="en-US" sz="2000" i="1" spc="-1" baseline="-25000" dirty="0">
                 <a:solidFill>
                   <a:srgbClr val="003056"/>
                 </a:solidFill>
@@ -16247,10 +16256,10 @@
                 <a:ea typeface="+mn-lt"/>
                 <a:cs typeface="+mn-lt"/>
               </a:rPr>
-              <a:t>, then check rank </a:t>
-            </a:r>
-            <a:r>
-              <a:rPr lang="en-US" sz="2000" i="1" spc="-1" err="1">
+              <a:t>i</a:t>
+            </a:r>
+            <a:r>
+              <a:rPr lang="en-US" sz="2000" i="1" spc="-1" baseline="30000" dirty="0">
                 <a:solidFill>
                   <a:srgbClr val="003056"/>
                 </a:solidFill>
@@ -16258,10 +16267,32 @@
                 <a:ea typeface="+mn-lt"/>
                 <a:cs typeface="+mn-lt"/>
               </a:rPr>
+              <a:t>s</a:t>
+            </a:r>
+            <a:r>
+              <a:rPr lang="en-US" sz="2000" spc="-1" dirty="0">
+                <a:solidFill>
+                  <a:srgbClr val="003056"/>
+                </a:solidFill>
+                <a:latin typeface="Calibri"/>
+                <a:ea typeface="+mn-lt"/>
+                <a:cs typeface="+mn-lt"/>
+              </a:rPr>
+              <a:t>, then check rank </a:t>
+            </a:r>
+            <a:r>
+              <a:rPr lang="en-US" sz="2000" i="1" spc="-1" dirty="0" err="1">
+                <a:solidFill>
+                  <a:srgbClr val="003056"/>
+                </a:solidFill>
+                <a:latin typeface="Calibri"/>
+                <a:ea typeface="+mn-lt"/>
+                <a:cs typeface="+mn-lt"/>
+              </a:rPr>
               <a:t>r</a:t>
             </a:r>
             <a:r>
-              <a:rPr lang="en-US" sz="2000" i="1" spc="-1" baseline="-25000" err="1">
+              <a:rPr lang="en-US" sz="2000" i="1" spc="-1" baseline="-25000" dirty="0" err="1">
                 <a:solidFill>
                   <a:srgbClr val="003056"/>
                 </a:solidFill>
@@ -16703,6 +16734,17 @@
               <a:t>D</a:t>
             </a:r>
             <a:r>
+              <a:rPr lang="en-US" sz="2000" i="1" spc="-1" baseline="-25000" dirty="0">
+                <a:solidFill>
+                  <a:srgbClr val="003056"/>
+                </a:solidFill>
+                <a:latin typeface="Calibri"/>
+                <a:ea typeface="+mn-lt"/>
+                <a:cs typeface="+mn-lt"/>
+              </a:rPr>
+              <a:t>s</a:t>
+            </a:r>
+            <a:r>
               <a:rPr lang="en-US" sz="2000" spc="-1" dirty="0">
                 <a:solidFill>
                   <a:srgbClr val="003056"/>
@@ -16884,7 +16926,7 @@
               <a:t>Entity linking</a:t>
             </a:r>
             <a:r>
-              <a:rPr lang="en-US" sz="1800" b="1" spc="-1">
+              <a:rPr lang="en-US" sz="1800" b="1" spc="-1" dirty="0">
                 <a:solidFill>
                   <a:srgbClr val="003056"/>
                 </a:solidFill>
@@ -16894,7 +16936,7 @@
               <a:t>: </a:t>
             </a:r>
             <a:r>
-              <a:rPr lang="en-US" sz="1800" spc="-1">
+              <a:rPr lang="en-US" sz="1800" spc="-1" dirty="0">
                 <a:solidFill>
                   <a:srgbClr val="003056"/>
                 </a:solidFill>
@@ -16904,7 +16946,7 @@
               <a:t>match </a:t>
             </a:r>
             <a:r>
-              <a:rPr lang="en-US" sz="1800" i="1" spc="-1">
+              <a:rPr lang="en-US" sz="1800" i="1" spc="-1" dirty="0">
                 <a:solidFill>
                   <a:srgbClr val="003056"/>
                 </a:solidFill>
@@ -16914,7 +16956,7 @@
               <a:t>mention</a:t>
             </a:r>
             <a:r>
-              <a:rPr lang="en-US" sz="1800" spc="-1">
+              <a:rPr lang="en-US" sz="1800" spc="-1" dirty="0">
                 <a:solidFill>
                   <a:srgbClr val="003056"/>
                 </a:solidFill>
@@ -16924,7 +16966,7 @@
               <a:t> in one language to </a:t>
             </a:r>
             <a:r>
-              <a:rPr lang="en-US" sz="1800" i="1" spc="-1">
+              <a:rPr lang="en-US" sz="1800" i="1" spc="-1" dirty="0">
                 <a:solidFill>
                   <a:srgbClr val="003056"/>
                 </a:solidFill>
@@ -16934,7 +16976,7 @@
               <a:t>entity </a:t>
             </a:r>
             <a:r>
-              <a:rPr lang="en-US" sz="1800" spc="-1">
+              <a:rPr lang="en-US" sz="1800" spc="-1" dirty="0">
                 <a:solidFill>
                   <a:srgbClr val="003056"/>
                 </a:solidFill>

</xml_diff>

<commit_message>
improved clarity of slides 18 and 19 in multilingual nlp lecture
</commit_message>
<xml_diff>
--- a/lectures/09_multilingual_nlp/09_multilingual_nlp.pptx
+++ b/lectures/09_multilingual_nlp/09_multilingual_nlp.pptx
@@ -147,7 +147,7 @@
 <file path=ppt/revisionInfo.xml><?xml version="1.0" encoding="utf-8"?>
 <p1510:revInfo xmlns:a="http://schemas.openxmlformats.org/drawingml/2006/main" xmlns:r="http://schemas.openxmlformats.org/officeDocument/2006/relationships" xmlns:p1510="http://schemas.microsoft.com/office/powerpoint/2015/10/main">
   <p1510:revLst>
-    <p1510:client id="{2AE81481-21E7-B4C0-AE59-5DE0F0957FD1}" v="7" dt="2025-05-28T10:03:09.031"/>
+    <p1510:client id="{C52BA15E-A2E3-D1D6-7E6A-FB69297A720D}" v="117" dt="2025-06-01T10:05:14.651"/>
   </p1510:revLst>
 </p1510:revInfo>
 </file>
@@ -14234,8 +14234,8 @@
         </p:nvSpPr>
         <p:spPr>
           <a:xfrm>
-            <a:off x="684000" y="1143000"/>
-            <a:ext cx="7775640" cy="4903603"/>
+            <a:off x="684000" y="1151404"/>
+            <a:ext cx="7775640" cy="4987647"/>
           </a:xfrm>
           <a:prstGeom prst="rect">
             <a:avLst/>
@@ -14691,7 +14691,7 @@
                 </a:solidFill>
                 <a:latin typeface="Calibri"/>
               </a:rPr>
-              <a:t>We could add a term to the training objective to force model to minimize distance between corresponding vectors for </a:t>
+              <a:t>E.g. minimize distance between vectors of </a:t>
             </a:r>
             <a:r>
               <a:rPr lang="en-US" sz="1800" i="1" spc="-1" dirty="0">
@@ -14723,7 +14723,7 @@
               <a:t>(</a:t>
             </a:r>
             <a:r>
-              <a:rPr lang="en-US" sz="1800" i="1" spc="-1" dirty="0" err="1">
+              <a:rPr lang="en-US" sz="1800" i="1" spc="-1" err="1">
                 <a:solidFill>
                   <a:srgbClr val="003056"/>
                 </a:solidFill>
@@ -14734,7 +14734,7 @@
               <a:t>s</a:t>
             </a:r>
             <a:r>
-              <a:rPr lang="en-US" sz="1200" i="1" spc="-1" baseline="-25000" dirty="0" err="1">
+              <a:rPr lang="en-US" sz="1800" i="1" spc="-1" baseline="-25000" err="1">
                 <a:solidFill>
                   <a:srgbClr val="003056"/>
                 </a:solidFill>
@@ -14745,7 +14745,7 @@
               <a:t>i</a:t>
             </a:r>
             <a:r>
-              <a:rPr lang="en-US" sz="1200" i="1" spc="-1" baseline="30000" dirty="0" err="1">
+              <a:rPr lang="en-US" sz="1800" i="1" spc="-1" baseline="30000" err="1">
                 <a:solidFill>
                   <a:srgbClr val="003056"/>
                 </a:solidFill>
@@ -14756,7 +14756,7 @@
               <a:t>s</a:t>
             </a:r>
             <a:r>
-              <a:rPr lang="en-US" sz="1800" i="1" spc="-1" dirty="0" err="1">
+              <a:rPr lang="en-US" sz="1800" i="1" spc="-1" err="1">
                 <a:solidFill>
                   <a:srgbClr val="003056"/>
                 </a:solidFill>
@@ -14767,7 +14767,7 @@
               <a:t>,s</a:t>
             </a:r>
             <a:r>
-              <a:rPr lang="en-US" sz="1200" i="1" spc="-1" baseline="-25000" dirty="0" err="1">
+              <a:rPr lang="en-US" sz="1800" i="1" spc="-1" baseline="-25000" err="1">
                 <a:solidFill>
                   <a:srgbClr val="003056"/>
                 </a:solidFill>
@@ -14778,7 +14778,7 @@
               <a:t>i</a:t>
             </a:r>
             <a:r>
-              <a:rPr lang="en-US" sz="1200" i="1" spc="-1" baseline="30000" dirty="0" err="1">
+              <a:rPr lang="en-US" sz="1800" i="1" spc="-1" baseline="30000" err="1">
                 <a:solidFill>
                   <a:srgbClr val="003056"/>
                 </a:solidFill>
@@ -14925,7 +14925,7 @@
               <a:t> = </a:t>
             </a:r>
             <a:r>
-              <a:rPr lang="en-US" sz="1800" b="1" i="1" spc="-1" dirty="0" err="1">
+              <a:rPr lang="en-US" sz="1800" b="1" i="1" spc="-1" err="1">
                 <a:solidFill>
                   <a:srgbClr val="003056"/>
                 </a:solidFill>
@@ -14934,7 +14934,7 @@
               <a:t>w</a:t>
             </a:r>
             <a:r>
-              <a:rPr lang="en-US" sz="1800" i="1" spc="-1" baseline="-25000" dirty="0" err="1">
+              <a:rPr lang="en-US" sz="1800" i="1" spc="-1" baseline="-25000" err="1">
                 <a:solidFill>
                   <a:srgbClr val="003056"/>
                 </a:solidFill>
@@ -14943,7 +14943,7 @@
               <a:t>j</a:t>
             </a:r>
             <a:r>
-              <a:rPr lang="en-US" sz="1800" i="1" spc="-1" baseline="30000" dirty="0" err="1">
+              <a:rPr lang="en-US" sz="1800" i="1" spc="-1" baseline="30000" err="1">
                 <a:solidFill>
                   <a:srgbClr val="003056"/>
                 </a:solidFill>
@@ -15061,7 +15061,7 @@
               <a:t>, </a:t>
             </a:r>
             <a:r>
-              <a:rPr lang="en-US" sz="1800" b="1" i="1" spc="-1" dirty="0" err="1">
+              <a:rPr lang="en-US" sz="1800" b="1" i="1" spc="-1" err="1">
                 <a:solidFill>
                   <a:srgbClr val="003056"/>
                 </a:solidFill>
@@ -15072,7 +15072,7 @@
               <a:t>w</a:t>
             </a:r>
             <a:r>
-              <a:rPr lang="en-US" sz="1800" i="1" spc="-1" baseline="-25000" dirty="0" err="1">
+              <a:rPr lang="en-US" sz="1800" i="1" spc="-1" baseline="-25000" err="1">
                 <a:solidFill>
                   <a:srgbClr val="003056"/>
                 </a:solidFill>
@@ -15083,7 +15083,7 @@
               <a:t>j</a:t>
             </a:r>
             <a:r>
-              <a:rPr lang="en-US" sz="1800" i="1" spc="-1" baseline="30000" dirty="0" err="1">
+              <a:rPr lang="en-US" sz="1800" i="1" spc="-1" baseline="30000" err="1">
                 <a:solidFill>
                   <a:srgbClr val="003056"/>
                 </a:solidFill>
@@ -15105,7 +15105,7 @@
               <a:t> are </a:t>
             </a:r>
             <a:r>
-              <a:rPr lang="en-US" sz="1800" i="1" spc="-1" dirty="0" err="1">
+              <a:rPr lang="en-US" sz="1800" i="1" spc="-1" err="1">
                 <a:solidFill>
                   <a:srgbClr val="003056"/>
                 </a:solidFill>
@@ -15116,7 +15116,7 @@
               <a:t>i</a:t>
             </a:r>
             <a:r>
-              <a:rPr lang="en-US" sz="1800" spc="-1" dirty="0" err="1">
+              <a:rPr lang="en-US" sz="1800" spc="-1" err="1">
                 <a:solidFill>
                   <a:srgbClr val="003056"/>
                 </a:solidFill>
@@ -15160,7 +15160,7 @@
               <a:t>-</a:t>
             </a:r>
             <a:r>
-              <a:rPr lang="en-US" sz="1800" spc="-1" dirty="0" err="1">
+              <a:rPr lang="en-US" sz="1800" spc="-1" err="1">
                 <a:solidFill>
                   <a:srgbClr val="003056"/>
                 </a:solidFill>
@@ -15259,7 +15259,7 @@
               <a:t>t</a:t>
             </a:r>
             <a:r>
-              <a:rPr lang="en-US" sz="1800" spc="-1" dirty="0">
+              <a:rPr lang="en-US" sz="1800" spc="-1">
                 <a:solidFill>
                   <a:srgbClr val="003056"/>
                 </a:solidFill>
@@ -15267,15 +15267,199 @@
                 <a:ea typeface="+mn-lt"/>
                 <a:cs typeface="+mn-lt"/>
               </a:rPr>
-              <a:t>, resp. (additional word alignment needed)</a:t>
-            </a:r>
-            <a:endParaRPr lang="en-US" sz="1800" spc="-1" dirty="0">
-              <a:solidFill>
-                <a:srgbClr val="003056"/>
-              </a:solidFill>
-              <a:latin typeface="Calibri"/>
-              <a:cs typeface="Arial"/>
-            </a:endParaRPr>
+              <a:t>, resp. </a:t>
+            </a:r>
+          </a:p>
+          <a:p>
+            <a:pPr marL="742950" lvl="1">
+              <a:lnSpc>
+                <a:spcPct val="100000"/>
+              </a:lnSpc>
+              <a:spcBef>
+                <a:spcPts val="360"/>
+              </a:spcBef>
+              <a:buClr>
+                <a:srgbClr val="003056"/>
+              </a:buClr>
+              <a:buFont typeface="Arial"/>
+              <a:buChar char="•"/>
+            </a:pPr>
+            <a:r>
+              <a:rPr lang="en-US" sz="1800" spc="-1">
+                <a:solidFill>
+                  <a:srgbClr val="003056"/>
+                </a:solidFill>
+                <a:latin typeface="Calibri"/>
+                <a:ea typeface="+mn-lt"/>
+                <a:cs typeface="+mn-lt"/>
+              </a:rPr>
+              <a:t>I.e. we </a:t>
+            </a:r>
+            <a:r>
+              <a:rPr lang="en-US" sz="1800" b="1" spc="-1">
+                <a:solidFill>
+                  <a:srgbClr val="003056"/>
+                </a:solidFill>
+                <a:latin typeface="Calibri"/>
+                <a:ea typeface="+mn-lt"/>
+                <a:cs typeface="+mn-lt"/>
+              </a:rPr>
+              <a:t>require new set D</a:t>
+            </a:r>
+            <a:r>
+              <a:rPr lang="en-US" sz="1800" b="1" spc="-1" baseline="-25000">
+                <a:solidFill>
+                  <a:srgbClr val="003056"/>
+                </a:solidFill>
+                <a:latin typeface="Calibri"/>
+                <a:ea typeface="+mn-lt"/>
+                <a:cs typeface="+mn-lt"/>
+              </a:rPr>
+              <a:t>w</a:t>
+            </a:r>
+            <a:r>
+              <a:rPr lang="en-US" sz="1800" b="1" spc="-1" baseline="-25000" dirty="0">
+                <a:solidFill>
+                  <a:srgbClr val="003056"/>
+                </a:solidFill>
+                <a:latin typeface="Calibri"/>
+                <a:ea typeface="+mn-lt"/>
+                <a:cs typeface="+mn-lt"/>
+              </a:rPr>
+              <a:t> </a:t>
+            </a:r>
+            <a:r>
+              <a:rPr lang="en-US" sz="1800" b="1" spc="-1">
+                <a:solidFill>
+                  <a:srgbClr val="003056"/>
+                </a:solidFill>
+                <a:latin typeface="Calibri"/>
+                <a:ea typeface="+mn-lt"/>
+                <a:cs typeface="+mn-lt"/>
+              </a:rPr>
+              <a:t>of aligned word pairs</a:t>
+            </a:r>
+            <a:r>
+              <a:rPr lang="en-US" sz="1800" spc="-1" dirty="0">
+                <a:solidFill>
+                  <a:srgbClr val="003056"/>
+                </a:solidFill>
+                <a:latin typeface="Calibri"/>
+                <a:ea typeface="+mn-lt"/>
+                <a:cs typeface="+mn-lt"/>
+              </a:rPr>
+              <a:t> </a:t>
+            </a:r>
+            <a:r>
+              <a:rPr lang="en-US" sz="2000" i="1" spc="-1">
+                <a:solidFill>
+                  <a:srgbClr val="003056"/>
+                </a:solidFill>
+                <a:latin typeface="Calibri"/>
+                <a:ea typeface="Calibri"/>
+                <a:cs typeface="Calibri"/>
+              </a:rPr>
+              <a:t>(w</a:t>
+            </a:r>
+            <a:r>
+              <a:rPr lang="en-US" sz="1800" i="1" spc="-1" baseline="-25000">
+                <a:solidFill>
+                  <a:srgbClr val="003056"/>
+                </a:solidFill>
+                <a:latin typeface="Calibri"/>
+                <a:ea typeface="Calibri"/>
+                <a:cs typeface="Calibri"/>
+              </a:rPr>
+              <a:t>i</a:t>
+            </a:r>
+            <a:r>
+              <a:rPr lang="en-US" sz="1800" i="1" spc="-1" baseline="30000">
+                <a:solidFill>
+                  <a:srgbClr val="003056"/>
+                </a:solidFill>
+                <a:latin typeface="Calibri"/>
+                <a:ea typeface="Calibri"/>
+                <a:cs typeface="Calibri"/>
+              </a:rPr>
+              <a:t>s</a:t>
+            </a:r>
+            <a:r>
+              <a:rPr lang="en-US" sz="2000" i="1" spc="-1" dirty="0">
+                <a:solidFill>
+                  <a:srgbClr val="003056"/>
+                </a:solidFill>
+                <a:latin typeface="Calibri"/>
+                <a:ea typeface="Calibri"/>
+                <a:cs typeface="Calibri"/>
+              </a:rPr>
+              <a:t>,</a:t>
+            </a:r>
+            <a:r>
+              <a:rPr lang="en-US" sz="1300" i="1" spc="-1" baseline="30000" dirty="0">
+                <a:solidFill>
+                  <a:srgbClr val="003056"/>
+                </a:solidFill>
+                <a:latin typeface="Calibri"/>
+                <a:ea typeface="Calibri"/>
+                <a:cs typeface="Calibri"/>
+              </a:rPr>
+              <a:t> </a:t>
+            </a:r>
+            <a:r>
+              <a:rPr lang="en-US" sz="2000" i="1" spc="-1">
+                <a:solidFill>
+                  <a:srgbClr val="003056"/>
+                </a:solidFill>
+                <a:latin typeface="Calibri"/>
+                <a:ea typeface="Calibri"/>
+                <a:cs typeface="Calibri"/>
+              </a:rPr>
+              <a:t>w</a:t>
+            </a:r>
+            <a:r>
+              <a:rPr lang="en-US" sz="1800" i="1" spc="-1" baseline="-25000">
+                <a:solidFill>
+                  <a:srgbClr val="003056"/>
+                </a:solidFill>
+                <a:latin typeface="Calibri"/>
+                <a:ea typeface="Calibri"/>
+                <a:cs typeface="Calibri"/>
+              </a:rPr>
+              <a:t>i</a:t>
+            </a:r>
+            <a:r>
+              <a:rPr lang="en-US" sz="1800" i="1" spc="-1" baseline="30000">
+                <a:solidFill>
+                  <a:srgbClr val="003056"/>
+                </a:solidFill>
+                <a:latin typeface="Calibri"/>
+                <a:ea typeface="Calibri"/>
+                <a:cs typeface="Calibri"/>
+              </a:rPr>
+              <a:t>t</a:t>
+            </a:r>
+            <a:r>
+              <a:rPr lang="en-US" sz="2000" i="1" spc="-1" dirty="0">
+                <a:solidFill>
+                  <a:srgbClr val="003056"/>
+                </a:solidFill>
+                <a:latin typeface="Calibri"/>
+                <a:ea typeface="Calibri"/>
+                <a:cs typeface="Calibri"/>
+              </a:rPr>
+              <a:t>)</a:t>
+            </a:r>
+            <a:r>
+              <a:rPr lang="en-US" sz="1800" spc="-1" dirty="0">
+                <a:solidFill>
+                  <a:srgbClr val="003056"/>
+                </a:solidFill>
+                <a:latin typeface="Calibri"/>
+                <a:ea typeface="+mn-lt"/>
+                <a:cs typeface="+mn-lt"/>
+              </a:rPr>
+              <a:t> </a:t>
+            </a:r>
           </a:p>
         </p:txBody>
       </p:sp>
@@ -15698,6 +15882,37 @@
                                   </p:childTnLst>
                                 </p:cTn>
                               </p:par>
+                              <p:par>
+                                <p:cTn id="31" presetID="1" presetClass="entr" presetSubtype="0" fill="hold" grpId="0" nodeType="withEffect">
+                                  <p:stCondLst>
+                                    <p:cond delay="0"/>
+                                  </p:stCondLst>
+                                  <p:childTnLst>
+                                    <p:set>
+                                      <p:cBhvr>
+                                        <p:cTn id="32" dur="1" fill="hold">
+                                          <p:stCondLst>
+                                            <p:cond delay="0"/>
+                                          </p:stCondLst>
+                                        </p:cTn>
+                                        <p:tgtEl>
+                                          <p:spTgt spid="95">
+                                            <p:txEl>
+                                              <p:pRg st="10" end="10"/>
+                                            </p:txEl>
+                                          </p:spTgt>
+                                        </p:tgtEl>
+                                        <p:attrNameLst>
+                                          <p:attrName>style.visibility</p:attrName>
+                                        </p:attrNameLst>
+                                      </p:cBhvr>
+                                      <p:to>
+                                        <p:strVal val="visible"/>
+                                      </p:to>
+                                    </p:set>
+                                  </p:childTnLst>
+                                </p:cTn>
+                              </p:par>
                             </p:childTnLst>
                           </p:cTn>
                         </p:par>
@@ -16061,7 +16276,7 @@
               <a:t> </a:t>
             </a:r>
             <a:r>
-              <a:rPr lang="en-US" sz="2000" i="1" spc="-1" dirty="0">
+              <a:rPr lang="en-US" sz="2000" i="1" spc="-1">
                 <a:solidFill>
                   <a:srgbClr val="003056"/>
                 </a:solidFill>
@@ -16072,7 +16287,7 @@
               <a:t>w</a:t>
             </a:r>
             <a:r>
-              <a:rPr lang="en-US" sz="2000" i="1" spc="-1" baseline="-25000" dirty="0">
+              <a:rPr lang="en-US" sz="2000" i="1" spc="-1" baseline="-25000">
                 <a:solidFill>
                   <a:srgbClr val="003056"/>
                 </a:solidFill>
@@ -16083,7 +16298,7 @@
               <a:t>i</a:t>
             </a:r>
             <a:r>
-              <a:rPr lang="en-US" sz="2000" i="1" spc="-1" baseline="30000" dirty="0">
+              <a:rPr lang="en-US" sz="2000" i="1" spc="-1" baseline="30000">
                 <a:solidFill>
                   <a:srgbClr val="003056"/>
                 </a:solidFill>
@@ -16094,7 +16309,7 @@
               <a:t>t</a:t>
             </a:r>
             <a:r>
-              <a:rPr lang="en-US" sz="2000" i="1" spc="-1" dirty="0">
+              <a:rPr lang="en-US" sz="2000" i="1" spc="-1">
                 <a:solidFill>
                   <a:srgbClr val="003056"/>
                 </a:solidFill>
@@ -16116,7 +16331,7 @@
               <a:t> </a:t>
             </a:r>
             <a:r>
-              <a:rPr lang="en-US" sz="2000" i="1" spc="-1" dirty="0">
+              <a:rPr lang="en-US" sz="2000" i="1" spc="-1">
                 <a:solidFill>
                   <a:srgbClr val="003056"/>
                 </a:solidFill>
@@ -16127,7 +16342,7 @@
               <a:t>D</a:t>
             </a:r>
             <a:r>
-              <a:rPr lang="en-US" sz="2000" i="1" spc="-1" baseline="-25000" dirty="0">
+              <a:rPr lang="en-US" sz="2000" i="1" spc="-1" baseline="-25000">
                 <a:solidFill>
                   <a:srgbClr val="003056"/>
                 </a:solidFill>
@@ -16135,7 +16350,7 @@
                 <a:ea typeface="+mn-lt"/>
                 <a:cs typeface="+mn-lt"/>
               </a:rPr>
-              <a:t>s</a:t>
+              <a:t>w</a:t>
             </a:r>
             <a:r>
               <a:rPr lang="en-US" sz="2000" i="1" spc="-1" dirty="0">
@@ -16204,7 +16419,7 @@
               <a:t> as query and rank all rows from </a:t>
             </a:r>
             <a:r>
-              <a:rPr lang="en-US" sz="2000" b="1" i="1" spc="-1" dirty="0" err="1">
+              <a:rPr lang="en-US" sz="2000" b="1" i="1" spc="-1" err="1">
                 <a:solidFill>
                   <a:srgbClr val="003056"/>
                 </a:solidFill>
@@ -16215,7 +16430,7 @@
               <a:t>W</a:t>
             </a:r>
             <a:r>
-              <a:rPr lang="en-US" sz="2000" i="1" spc="-1" baseline="30000" dirty="0" err="1">
+              <a:rPr lang="en-US" sz="2000" i="1" spc="-1" baseline="30000" err="1">
                 <a:solidFill>
                   <a:srgbClr val="003056"/>
                 </a:solidFill>
@@ -16281,7 +16496,7 @@
               <a:t>, then check rank </a:t>
             </a:r>
             <a:r>
-              <a:rPr lang="en-US" sz="2000" i="1" spc="-1" dirty="0" err="1">
+              <a:rPr lang="en-US" sz="2000" i="1" spc="-1" err="1">
                 <a:solidFill>
                   <a:srgbClr val="003056"/>
                 </a:solidFill>
@@ -16292,7 +16507,7 @@
               <a:t>r</a:t>
             </a:r>
             <a:r>
-              <a:rPr lang="en-US" sz="2000" i="1" spc="-1" baseline="-25000" dirty="0" err="1">
+              <a:rPr lang="en-US" sz="2000" i="1" spc="-1" baseline="-25000" err="1">
                 <a:solidFill>
                   <a:srgbClr val="003056"/>
                 </a:solidFill>
@@ -16734,7 +16949,7 @@
               <a:t>D</a:t>
             </a:r>
             <a:r>
-              <a:rPr lang="en-US" sz="2000" i="1" spc="-1" baseline="-25000" dirty="0">
+              <a:rPr lang="en-US" sz="2000" i="1" spc="-1" baseline="-25000">
                 <a:solidFill>
                   <a:srgbClr val="003056"/>
                 </a:solidFill>
@@ -16742,7 +16957,7 @@
                 <a:ea typeface="+mn-lt"/>
                 <a:cs typeface="+mn-lt"/>
               </a:rPr>
-              <a:t>s</a:t>
+              <a:t>w</a:t>
             </a:r>
             <a:r>
               <a:rPr lang="en-US" sz="2000" spc="-1" dirty="0">

</xml_diff>